<commit_message>
Update the AWS Lambda with latest solution of .NET80
</commit_message>
<xml_diff>
--- a/PPTX-to-Image-conversion/Convert-PowerPoint-presentation-to-Image/AWS/AWS_Lambda/Convert-PowerPoint-Presentation-to-Image/Data/Input.pptx
+++ b/PPTX-to-Image-conversion/Convert-PowerPoint-presentation-to-Image/AWS/AWS_Lambda/Convert-PowerPoint-Presentation-to-Image/Data/Input.pptx
@@ -287,7 +287,7 @@
           <a:p>
             <a:fld id="{8669AFDC-7658-4951-B0FF-52DFF2A93C0A}" type="datetimeFigureOut">
               <a:rPr lang="en-US" dirty="0"/>
-              <a:t>1/13/2023</a:t>
+              <a:t>10/10/2023</a:t>
             </a:fld>
             <a:endParaRPr lang="en-US" dirty="0"/>
           </a:p>
@@ -471,7 +471,7 @@
           <a:p>
             <a:fld id="{3ABD2D7A-D230-4F91-BD59-0A39C2703BA8}" type="datetimeFigureOut">
               <a:rPr lang="en-US" dirty="0"/>
-              <a:t>1/13/2023</a:t>
+              <a:t>10/10/2023</a:t>
             </a:fld>
             <a:endParaRPr lang="en-US" dirty="0"/>
           </a:p>
@@ -867,7 +867,7 @@
           <a:p>
             <a:fld id="{03F41C87-7AD9-4845-A077-840E4A0F3F06}" type="datetimeFigureOut">
               <a:rPr lang="en-US" dirty="0"/>
-              <a:t>1/13/2023</a:t>
+              <a:t>10/10/2023</a:t>
             </a:fld>
             <a:endParaRPr lang="en-US" dirty="0"/>
           </a:p>
@@ -1062,7 +1062,7 @@
           <a:p>
             <a:fld id="{03F41C87-7AD9-4845-A077-840E4A0F3F06}" type="datetimeFigureOut">
               <a:rPr lang="en-US" dirty="0"/>
-              <a:t>1/13/2023</a:t>
+              <a:t>10/10/2023</a:t>
             </a:fld>
             <a:endParaRPr lang="en-US" dirty="0"/>
           </a:p>
@@ -1324,7 +1324,7 @@
           <a:p>
             <a:fld id="{03F41C87-7AD9-4845-A077-840E4A0F3F06}" type="datetimeFigureOut">
               <a:rPr lang="en-US" dirty="0"/>
-              <a:t>1/13/2023</a:t>
+              <a:t>10/10/2023</a:t>
             </a:fld>
             <a:endParaRPr lang="en-US" dirty="0"/>
           </a:p>
@@ -1574,7 +1574,7 @@
           <a:p>
             <a:fld id="{03F41C87-7AD9-4845-A077-840E4A0F3F06}" type="datetimeFigureOut">
               <a:rPr lang="en-US" dirty="0"/>
-              <a:t>1/13/2023</a:t>
+              <a:t>10/10/2023</a:t>
             </a:fld>
             <a:endParaRPr lang="en-US" dirty="0"/>
           </a:p>
@@ -1964,7 +1964,7 @@
           <a:p>
             <a:fld id="{03F41C87-7AD9-4845-A077-840E4A0F3F06}" type="datetimeFigureOut">
               <a:rPr lang="en-US" dirty="0"/>
-              <a:t>1/13/2023</a:t>
+              <a:t>10/10/2023</a:t>
             </a:fld>
             <a:endParaRPr lang="en-US" dirty="0"/>
           </a:p>
@@ -2096,7 +2096,7 @@
           <a:p>
             <a:fld id="{03F41C87-7AD9-4845-A077-840E4A0F3F06}" type="datetimeFigureOut">
               <a:rPr lang="en-US" dirty="0"/>
-              <a:t>1/13/2023</a:t>
+              <a:t>10/10/2023</a:t>
             </a:fld>
             <a:endParaRPr lang="en-US" dirty="0"/>
           </a:p>
@@ -2201,7 +2201,7 @@
           <a:p>
             <a:fld id="{03F41C87-7AD9-4845-A077-840E4A0F3F06}" type="datetimeFigureOut">
               <a:rPr lang="en-US" dirty="0"/>
-              <a:t>1/13/2023</a:t>
+              <a:t>10/10/2023</a:t>
             </a:fld>
             <a:endParaRPr lang="en-US" dirty="0"/>
           </a:p>
@@ -2496,7 +2496,7 @@
           <a:p>
             <a:fld id="{03F41C87-7AD9-4845-A077-840E4A0F3F06}" type="datetimeFigureOut">
               <a:rPr lang="en-US" dirty="0"/>
-              <a:t>1/13/2023</a:t>
+              <a:t>10/10/2023</a:t>
             </a:fld>
             <a:endParaRPr lang="en-US" dirty="0"/>
           </a:p>
@@ -2769,7 +2769,7 @@
           <a:p>
             <a:fld id="{B61BEF0D-F0BB-DE4B-95CE-6DB70DBA9567}" type="datetimeFigureOut">
               <a:rPr lang="en-US" dirty="0"/>
-              <a:t>1/13/2023</a:t>
+              <a:t>10/10/2023</a:t>
             </a:fld>
             <a:endParaRPr lang="en-US" dirty="0"/>
           </a:p>
@@ -2956,7 +2956,7 @@
           <a:p>
             <a:fld id="{03F41C87-7AD9-4845-A077-840E4A0F3F06}" type="datetimeFigureOut">
               <a:rPr lang="en-US" dirty="0"/>
-              <a:t>1/13/2023</a:t>
+              <a:t>10/10/2023</a:t>
             </a:fld>
             <a:endParaRPr lang="en-US" dirty="0"/>
           </a:p>
@@ -3186,7 +3186,7 @@
           <a:p>
             <a:fld id="{03F41C87-7AD9-4845-A077-840E4A0F3F06}" type="datetimeFigureOut">
               <a:rPr lang="en-US" dirty="0"/>
-              <a:t>1/13/2023</a:t>
+              <a:t>10/10/2023</a:t>
             </a:fld>
             <a:endParaRPr lang="en-US" dirty="0"/>
           </a:p>
@@ -3615,7 +3615,10 @@
           <a:p>
             <a:pPr algn="ctr"/>
             <a:r>
-              <a:rPr dirty="0"/>
+              <a:rPr dirty="0">
+                <a:latin typeface="Calibri" panose="020F0502020204030204" pitchFamily="34" charset="0"/>
+                <a:cs typeface="Calibri" panose="020F0502020204030204" pitchFamily="34" charset="0"/>
+              </a:rPr>
               <a:t>Company History</a:t>
             </a:r>
           </a:p>
@@ -3650,15 +3653,24 @@
           <a:p>
             <a:pPr defTabSz="914126"/>
             <a:r>
-              <a:rPr sz="1799" dirty="0"/>
+              <a:rPr sz="1799" dirty="0">
+                <a:latin typeface="Calibri" panose="020F0502020204030204" pitchFamily="34" charset="0"/>
+                <a:cs typeface="Calibri" panose="020F0502020204030204" pitchFamily="34" charset="0"/>
+              </a:rPr>
               <a:t>IMN Solutions PVT LTD is the software company, established in 1987, by George Milton. The company has been listed as the trusted partner for many high-profile organizations since 1988 and got awards for quality product</a:t>
             </a:r>
             <a:r>
-              <a:rPr lang="en-US" sz="1799" dirty="0"/>
+              <a:rPr lang="en-US" sz="1799" dirty="0">
+                <a:latin typeface="Calibri" panose="020F0502020204030204" pitchFamily="34" charset="0"/>
+                <a:cs typeface="Calibri" panose="020F0502020204030204" pitchFamily="34" charset="0"/>
+              </a:rPr>
               <a:t>ion</a:t>
             </a:r>
             <a:r>
-              <a:rPr sz="1799" dirty="0"/>
+              <a:rPr sz="1799" dirty="0">
+                <a:latin typeface="Calibri" panose="020F0502020204030204" pitchFamily="34" charset="0"/>
+                <a:cs typeface="Calibri" panose="020F0502020204030204" pitchFamily="34" charset="0"/>
+              </a:rPr>
               <a:t> from reputed organizations.</a:t>
             </a:r>
           </a:p>
@@ -3695,15 +3707,24 @@
               <a:buAutoNum type="arabicPeriod"/>
             </a:pPr>
             <a:r>
-              <a:rPr sz="1799" dirty="0"/>
+              <a:rPr sz="1799" dirty="0">
+                <a:latin typeface="Calibri" panose="020F0502020204030204" pitchFamily="34" charset="0"/>
+                <a:cs typeface="Calibri" panose="020F0502020204030204" pitchFamily="34" charset="0"/>
+              </a:rPr>
               <a:t>The company </a:t>
             </a:r>
             <a:r>
-              <a:rPr lang="en-US" sz="1799" dirty="0"/>
+              <a:rPr lang="en-US" sz="1799" dirty="0">
+                <a:latin typeface="Calibri" panose="020F0502020204030204" pitchFamily="34" charset="0"/>
+                <a:cs typeface="Calibri" panose="020F0502020204030204" pitchFamily="34" charset="0"/>
+              </a:rPr>
               <a:t>product </a:t>
             </a:r>
             <a:r>
-              <a:rPr sz="1799" dirty="0"/>
+              <a:rPr sz="1799" dirty="0">
+                <a:latin typeface="Calibri" panose="020F0502020204030204" pitchFamily="34" charset="0"/>
+                <a:cs typeface="Calibri" panose="020F0502020204030204" pitchFamily="34" charset="0"/>
+              </a:rPr>
               <a:t>acquired the MCY corporation for 20 billion dollars and became the top revenue maker for the year 2015.</a:t>
             </a:r>
           </a:p>
@@ -3712,7 +3733,10 @@
               <a:buAutoNum type="arabicPeriod"/>
             </a:pPr>
             <a:r>
-              <a:rPr sz="1799" dirty="0"/>
+              <a:rPr sz="1799" dirty="0">
+                <a:latin typeface="Calibri" panose="020F0502020204030204" pitchFamily="34" charset="0"/>
+                <a:cs typeface="Calibri" panose="020F0502020204030204" pitchFamily="34" charset="0"/>
+              </a:rPr>
               <a:t>The company is participating in top open source projects in automation industry.</a:t>
             </a:r>
           </a:p>
@@ -3793,7 +3817,10 @@
           <a:p>
             <a:pPr algn="ctr" defTabSz="914126"/>
             <a:r>
-              <a:rPr sz="1799" dirty="0"/>
+              <a:rPr sz="1799" dirty="0">
+                <a:latin typeface="Calibri" panose="020F0502020204030204" pitchFamily="34" charset="0"/>
+                <a:cs typeface="Calibri" panose="020F0502020204030204" pitchFamily="34" charset="0"/>
+              </a:rPr>
               <a:t>IMN</a:t>
             </a:r>
           </a:p>
@@ -3850,16 +3877,16 @@
           <a:p>
             <a:r>
               <a:rPr lang="en-US" sz="3999" dirty="0">
-                <a:latin typeface="Helvetica CE 35 Thin"/>
+                <a:latin typeface="Calibri" panose="020F0502020204030204" pitchFamily="34" charset="0"/>
                 <a:ea typeface="Helvetica CE 35 Thin"/>
-                <a:cs typeface="Helvetica CE 35 Thin"/>
+                <a:cs typeface="Calibri" panose="020F0502020204030204" pitchFamily="34" charset="0"/>
               </a:rPr>
               <a:t>Product Overview</a:t>
             </a:r>
             <a:endParaRPr sz="3999" dirty="0">
-              <a:latin typeface="Helvetica CE 35 Thin"/>
+              <a:latin typeface="Calibri" panose="020F0502020204030204" pitchFamily="34" charset="0"/>
               <a:ea typeface="Helvetica CE 35 Thin"/>
-              <a:cs typeface="Helvetica CE 35 Thin"/>
+              <a:cs typeface="Calibri" panose="020F0502020204030204" pitchFamily="34" charset="0"/>
             </a:endParaRPr>
           </a:p>
         </p:txBody>
@@ -3890,69 +3917,69 @@
           </a:bodyPr>
           <a:lstStyle/>
           <a:p>
-            <a:pPr marL="285664" indent="-285664">
-              <a:buFont typeface="Arial"/>
-              <a:buChar char="•"/>
+            <a:pPr marL="342900" indent="-342900">
+              <a:buFont typeface="+mj-lt"/>
+              <a:buAutoNum type="arabicPeriod"/>
             </a:pPr>
             <a:r>
               <a:rPr lang="en-US" sz="1799" dirty="0">
                 <a:solidFill>
                   <a:srgbClr val="000000"/>
                 </a:solidFill>
-                <a:latin typeface="Calibri (Body)"/>
+                <a:latin typeface="Calibri" panose="020F0502020204030204" pitchFamily="34" charset="0"/>
                 <a:ea typeface="Calibri (Body)"/>
-                <a:cs typeface="Calibri (Body)"/>
+                <a:cs typeface="Calibri" panose="020F0502020204030204" pitchFamily="34" charset="0"/>
               </a:rPr>
               <a:t>Adventure Works Cycles, the fictitious company on which the Adventure Works sample databases are based, is a large, multinational manufacturing company. </a:t>
             </a:r>
           </a:p>
           <a:p>
-            <a:pPr marL="285664" indent="-285664">
-              <a:buFont typeface="Arial"/>
-              <a:buChar char="•"/>
+            <a:pPr marL="342900" indent="-342900">
+              <a:buFont typeface="+mj-lt"/>
+              <a:buAutoNum type="arabicPeriod"/>
             </a:pPr>
             <a:r>
               <a:rPr lang="en-US" sz="1799" dirty="0">
                 <a:solidFill>
                   <a:srgbClr val="000000"/>
                 </a:solidFill>
-                <a:latin typeface="Calibri (Body)"/>
+                <a:latin typeface="Calibri" panose="020F0502020204030204" pitchFamily="34" charset="0"/>
                 <a:ea typeface="Calibri (Body)"/>
-                <a:cs typeface="Calibri (Body)"/>
+                <a:cs typeface="Calibri" panose="020F0502020204030204" pitchFamily="34" charset="0"/>
               </a:rPr>
               <a:t>The company manufactures and sells metal and composite bicycles to North American, European and Asian commercial markets. While its base operation is located in Bothell, Washington with 290 employees, several regional sales teams are located throughout their market base.</a:t>
             </a:r>
           </a:p>
           <a:p>
-            <a:pPr marL="285664" indent="-285664">
-              <a:buFont typeface="Arial"/>
-              <a:buChar char="•"/>
+            <a:pPr marL="342900" indent="-342900">
+              <a:buFont typeface="+mj-lt"/>
+              <a:buAutoNum type="arabicPeriod"/>
             </a:pPr>
             <a:r>
               <a:rPr lang="en-US" sz="1799" dirty="0">
                 <a:solidFill>
                   <a:srgbClr val="000000"/>
                 </a:solidFill>
-                <a:latin typeface="Calibri (Body)"/>
+                <a:latin typeface="Calibri" panose="020F0502020204030204" pitchFamily="34" charset="0"/>
                 <a:ea typeface="Calibri (Body)"/>
-                <a:cs typeface="Calibri (Body)"/>
+                <a:cs typeface="Calibri" panose="020F0502020204030204" pitchFamily="34" charset="0"/>
               </a:rPr>
               <a:t>In 2000, Adventure Works Cycles bought a small manufacturing plant, Importadores Neptuno, located in Mexico. Importadores Neptuno manufactures several critical subcomponents for the Adventure Works Cycles production line. </a:t>
             </a:r>
           </a:p>
           <a:p>
-            <a:pPr marL="285664" indent="-285664">
-              <a:buFont typeface="Arial"/>
-              <a:buChar char="•"/>
+            <a:pPr marL="342900" indent="-342900">
+              <a:buFont typeface="+mj-lt"/>
+              <a:buAutoNum type="arabicPeriod"/>
             </a:pPr>
             <a:r>
               <a:rPr lang="en-US" sz="1799" dirty="0">
                 <a:solidFill>
                   <a:srgbClr val="000000"/>
                 </a:solidFill>
-                <a:latin typeface="Calibri (Body)"/>
+                <a:latin typeface="Calibri" panose="020F0502020204030204" pitchFamily="34" charset="0"/>
                 <a:ea typeface="Calibri (Body)"/>
-                <a:cs typeface="Calibri (Body)"/>
+                <a:cs typeface="Calibri" panose="020F0502020204030204" pitchFamily="34" charset="0"/>
               </a:rPr>
               <a:t>These subcomponents are shipped to the Bothell location for final product assembly. In 2001, Importadores Neptuno, became the sole manufacturer and distributor of the touring bicycle productivity group.</a:t>
             </a:r>
@@ -4010,20 +4037,23 @@
           <a:p>
             <a:pPr algn="ctr"/>
             <a:r>
-              <a:rPr sz="2799" b="1" cap="all" dirty="0">
-                <a:latin typeface="Arial"/>
+              <a:rPr sz="2799" cap="all" dirty="0">
+                <a:latin typeface="Calibri" panose="020F0502020204030204" pitchFamily="34" charset="0"/>
+                <a:cs typeface="Calibri" panose="020F0502020204030204" pitchFamily="34" charset="0"/>
               </a:rPr>
               <a:t>Target </a:t>
             </a:r>
             <a:r>
               <a:rPr sz="1799" dirty="0">
-                <a:latin typeface="Arial"/>
+                <a:latin typeface="Calibri" panose="020F0502020204030204" pitchFamily="34" charset="0"/>
+                <a:cs typeface="Calibri" panose="020F0502020204030204" pitchFamily="34" charset="0"/>
               </a:rPr>
               <a:t>Vs </a:t>
             </a:r>
             <a:r>
-              <a:rPr sz="2799" b="1" dirty="0">
-                <a:latin typeface="Arial"/>
+              <a:rPr sz="2799" dirty="0">
+                <a:latin typeface="Calibri" panose="020F0502020204030204" pitchFamily="34" charset="0"/>
+                <a:cs typeface="Calibri" panose="020F0502020204030204" pitchFamily="34" charset="0"/>
               </a:rPr>
               <a:t>PERFORMANCE</a:t>
             </a:r>
@@ -4034,11 +4064,17 @@
         <p:nvGraphicFramePr>
           <p:cNvPr id="3" name="Table 3"/>
           <p:cNvGraphicFramePr/>
-          <p:nvPr/>
+          <p:nvPr>
+            <p:extLst>
+              <p:ext uri="{D42A27DB-BD31-4B8C-83A1-F6EECF244321}">
+                <p14:modId xmlns:p14="http://schemas.microsoft.com/office/powerpoint/2010/main" val="3426679466"/>
+              </p:ext>
+            </p:extLst>
+          </p:nvPr>
         </p:nvGraphicFramePr>
         <p:xfrm>
-          <a:off x="786179" y="1216729"/>
-          <a:ext cx="10855674" cy="4928836"/>
+          <a:off x="760412" y="1216729"/>
+          <a:ext cx="10437524" cy="4928836"/>
         </p:xfrm>
         <a:graphic>
           <a:graphicData uri="http://schemas.openxmlformats.org/drawingml/2006/table">
@@ -4047,7 +4083,7 @@
                 <a:tableStyleId>{93296810-A885-4BE3-A3E7-6D5BEEA58F35}</a:tableStyleId>
               </a:tblPr>
               <a:tblGrid>
-                <a:gridCol w="1206186">
+                <a:gridCol w="788036">
                   <a:extLst>
                     <a:ext uri="{9D8B030D-6E8A-4147-A177-3AD203B41FA5}">
                       <a16:colId xmlns:a16="http://schemas.microsoft.com/office/drawing/2014/main" val="20000"/>
@@ -4119,11 +4155,16 @@
                     <a:p>
                       <a:pPr algn="ctr" defTabSz="914400"/>
                       <a:r>
-                        <a:rPr sz="1400" b="1" dirty="0">
-                          <a:latin typeface="Arial"/>
+                        <a:rPr lang="en-US" sz="1400" b="0" dirty="0">
+                          <a:latin typeface="Calibri" panose="020F0502020204030204" pitchFamily="34" charset="0"/>
+                          <a:cs typeface="Calibri" panose="020F0502020204030204" pitchFamily="34" charset="0"/>
                         </a:rPr>
                         <a:t>Month</a:t>
                       </a:r>
+                      <a:endParaRPr sz="1400" b="0" dirty="0">
+                        <a:latin typeface="Calibri" panose="020F0502020204030204" pitchFamily="34" charset="0"/>
+                        <a:cs typeface="Calibri" panose="020F0502020204030204" pitchFamily="34" charset="0"/>
+                      </a:endParaRPr>
                     </a:p>
                   </a:txBody>
                   <a:tcPr marL="91416" marR="91416" marT="45708" marB="45708" anchor="ctr" horzOverflow="overflow"/>
@@ -4135,8 +4176,9 @@
                     <a:p>
                       <a:pPr algn="ctr" defTabSz="914400"/>
                       <a:r>
-                        <a:rPr sz="1400" b="1" dirty="0">
-                          <a:latin typeface="Arial"/>
+                        <a:rPr sz="1400" b="0" dirty="0">
+                          <a:latin typeface="Calibri" panose="020F0502020204030204" pitchFamily="34" charset="0"/>
+                          <a:cs typeface="Calibri" panose="020F0502020204030204" pitchFamily="34" charset="0"/>
                         </a:rPr>
                         <a:t>Product A</a:t>
                       </a:r>
@@ -4151,8 +4193,9 @@
                     <a:p>
                       <a:pPr algn="ctr" defTabSz="914400"/>
                       <a:r>
-                        <a:rPr sz="1400" b="1" dirty="0">
-                          <a:latin typeface="Arial"/>
+                        <a:rPr sz="1400" b="0" dirty="0">
+                          <a:latin typeface="Calibri" panose="020F0502020204030204" pitchFamily="34" charset="0"/>
+                          <a:cs typeface="Calibri" panose="020F0502020204030204" pitchFamily="34" charset="0"/>
                         </a:rPr>
                         <a:t>Product B</a:t>
                       </a:r>
@@ -4167,8 +4210,9 @@
                     <a:p>
                       <a:pPr algn="ctr" defTabSz="914400"/>
                       <a:r>
-                        <a:rPr sz="1400" b="1" dirty="0">
-                          <a:latin typeface="Arial"/>
+                        <a:rPr sz="1400" b="0" dirty="0">
+                          <a:latin typeface="Calibri" panose="020F0502020204030204" pitchFamily="34" charset="0"/>
+                          <a:cs typeface="Calibri" panose="020F0502020204030204" pitchFamily="34" charset="0"/>
                         </a:rPr>
                         <a:t>Product C</a:t>
                       </a:r>
@@ -4183,8 +4227,9 @@
                     <a:p>
                       <a:pPr algn="ctr" defTabSz="914400"/>
                       <a:r>
-                        <a:rPr sz="1400" b="1" dirty="0">
-                          <a:latin typeface="Arial"/>
+                        <a:rPr sz="1400" b="0" dirty="0">
+                          <a:latin typeface="Calibri" panose="020F0502020204030204" pitchFamily="34" charset="0"/>
+                          <a:cs typeface="Calibri" panose="020F0502020204030204" pitchFamily="34" charset="0"/>
                         </a:rPr>
                         <a:t>Product D</a:t>
                       </a:r>
@@ -4199,8 +4244,9 @@
                     <a:p>
                       <a:pPr algn="ctr" defTabSz="914400"/>
                       <a:r>
-                        <a:rPr sz="1400" b="1" dirty="0">
-                          <a:latin typeface="Arial"/>
+                        <a:rPr sz="1400" b="0" dirty="0">
+                          <a:latin typeface="Calibri" panose="020F0502020204030204" pitchFamily="34" charset="0"/>
+                          <a:cs typeface="Calibri" panose="020F0502020204030204" pitchFamily="34" charset="0"/>
                         </a:rPr>
                         <a:t>Product E</a:t>
                       </a:r>
@@ -4215,8 +4261,9 @@
                     <a:p>
                       <a:pPr algn="ctr" defTabSz="914400"/>
                       <a:r>
-                        <a:rPr sz="1400" b="1" dirty="0">
-                          <a:latin typeface="Arial"/>
+                        <a:rPr sz="1400" b="0" dirty="0">
+                          <a:latin typeface="Calibri" panose="020F0502020204030204" pitchFamily="34" charset="0"/>
+                          <a:cs typeface="Calibri" panose="020F0502020204030204" pitchFamily="34" charset="0"/>
                         </a:rPr>
                         <a:t>Product F</a:t>
                       </a:r>
@@ -4231,8 +4278,9 @@
                     <a:p>
                       <a:pPr algn="ctr" defTabSz="914400"/>
                       <a:r>
-                        <a:rPr sz="1400" b="1" dirty="0">
-                          <a:latin typeface="Arial"/>
+                        <a:rPr sz="1400" b="0" dirty="0">
+                          <a:latin typeface="Calibri" panose="020F0502020204030204" pitchFamily="34" charset="0"/>
+                          <a:cs typeface="Calibri" panose="020F0502020204030204" pitchFamily="34" charset="0"/>
                         </a:rPr>
                         <a:t>Average</a:t>
                       </a:r>
@@ -4247,8 +4295,9 @@
                     <a:p>
                       <a:pPr algn="ctr" defTabSz="914400"/>
                       <a:r>
-                        <a:rPr sz="1400" b="1" dirty="0">
-                          <a:latin typeface="Arial"/>
+                        <a:rPr sz="1400" b="0" dirty="0">
+                          <a:latin typeface="Calibri" panose="020F0502020204030204" pitchFamily="34" charset="0"/>
+                          <a:cs typeface="Calibri" panose="020F0502020204030204" pitchFamily="34" charset="0"/>
                         </a:rPr>
                         <a:t>Target</a:t>
                       </a:r>
@@ -4271,7 +4320,8 @@
                       <a:pPr algn="l" defTabSz="914400"/>
                       <a:r>
                         <a:rPr sz="1400" dirty="0">
-                          <a:latin typeface="Arial"/>
+                          <a:latin typeface="Calibri" panose="020F0502020204030204" pitchFamily="34" charset="0"/>
+                          <a:cs typeface="Calibri" panose="020F0502020204030204" pitchFamily="34" charset="0"/>
                         </a:rPr>
                         <a:t>Jan</a:t>
                       </a:r>
@@ -4287,7 +4337,8 @@
                       <a:pPr algn="l" defTabSz="914400"/>
                       <a:r>
                         <a:rPr sz="1400" dirty="0">
-                          <a:latin typeface="Arial"/>
+                          <a:latin typeface="Calibri" panose="020F0502020204030204" pitchFamily="34" charset="0"/>
+                          <a:cs typeface="Calibri" panose="020F0502020204030204" pitchFamily="34" charset="0"/>
                         </a:rPr>
                         <a:t>20000</a:t>
                       </a:r>
@@ -4303,7 +4354,8 @@
                       <a:pPr algn="l" defTabSz="914400"/>
                       <a:r>
                         <a:rPr sz="1400" dirty="0">
-                          <a:latin typeface="Arial"/>
+                          <a:latin typeface="Calibri" panose="020F0502020204030204" pitchFamily="34" charset="0"/>
+                          <a:cs typeface="Calibri" panose="020F0502020204030204" pitchFamily="34" charset="0"/>
                         </a:rPr>
                         <a:t>4200</a:t>
                       </a:r>
@@ -4319,7 +4371,8 @@
                       <a:pPr algn="l" defTabSz="914400"/>
                       <a:r>
                         <a:rPr sz="1400" dirty="0">
-                          <a:latin typeface="Arial"/>
+                          <a:latin typeface="Calibri" panose="020F0502020204030204" pitchFamily="34" charset="0"/>
+                          <a:cs typeface="Calibri" panose="020F0502020204030204" pitchFamily="34" charset="0"/>
                         </a:rPr>
                         <a:t>8000</a:t>
                       </a:r>
@@ -4335,7 +4388,8 @@
                       <a:pPr algn="l" defTabSz="914400"/>
                       <a:r>
                         <a:rPr sz="1400" dirty="0">
-                          <a:latin typeface="Arial"/>
+                          <a:latin typeface="Calibri" panose="020F0502020204030204" pitchFamily="34" charset="0"/>
+                          <a:cs typeface="Calibri" panose="020F0502020204030204" pitchFamily="34" charset="0"/>
                         </a:rPr>
                         <a:t>12000</a:t>
                       </a:r>
@@ -4351,7 +4405,8 @@
                       <a:pPr algn="l" defTabSz="914400"/>
                       <a:r>
                         <a:rPr sz="1400" dirty="0">
-                          <a:latin typeface="Arial"/>
+                          <a:latin typeface="Calibri" panose="020F0502020204030204" pitchFamily="34" charset="0"/>
+                          <a:cs typeface="Calibri" panose="020F0502020204030204" pitchFamily="34" charset="0"/>
                         </a:rPr>
                         <a:t>4700</a:t>
                       </a:r>
@@ -4367,7 +4422,8 @@
                       <a:pPr algn="l" defTabSz="914400"/>
                       <a:r>
                         <a:rPr sz="1400" dirty="0">
-                          <a:latin typeface="Arial"/>
+                          <a:latin typeface="Calibri" panose="020F0502020204030204" pitchFamily="34" charset="0"/>
+                          <a:cs typeface="Calibri" panose="020F0502020204030204" pitchFamily="34" charset="0"/>
                         </a:rPr>
                         <a:t>15000</a:t>
                       </a:r>
@@ -4383,7 +4439,8 @@
                       <a:pPr algn="l" defTabSz="914400"/>
                       <a:r>
                         <a:rPr sz="1400" dirty="0">
-                          <a:latin typeface="Arial"/>
+                          <a:latin typeface="Calibri" panose="020F0502020204030204" pitchFamily="34" charset="0"/>
+                          <a:cs typeface="Calibri" panose="020F0502020204030204" pitchFamily="34" charset="0"/>
                         </a:rPr>
                         <a:t>10650</a:t>
                       </a:r>
@@ -4399,7 +4456,8 @@
                       <a:pPr algn="l" defTabSz="914400"/>
                       <a:r>
                         <a:rPr sz="1400" dirty="0">
-                          <a:latin typeface="Arial"/>
+                          <a:latin typeface="Calibri" panose="020F0502020204030204" pitchFamily="34" charset="0"/>
+                          <a:cs typeface="Calibri" panose="020F0502020204030204" pitchFamily="34" charset="0"/>
                         </a:rPr>
                         <a:t>35000</a:t>
                       </a:r>
@@ -4422,7 +4480,8 @@
                       <a:pPr algn="l" defTabSz="914400"/>
                       <a:r>
                         <a:rPr sz="1400" dirty="0">
-                          <a:latin typeface="Arial"/>
+                          <a:latin typeface="Calibri" panose="020F0502020204030204" pitchFamily="34" charset="0"/>
+                          <a:cs typeface="Calibri" panose="020F0502020204030204" pitchFamily="34" charset="0"/>
                         </a:rPr>
                         <a:t>Feb</a:t>
                       </a:r>
@@ -4438,7 +4497,8 @@
                       <a:pPr algn="l" defTabSz="914400"/>
                       <a:r>
                         <a:rPr sz="1400" dirty="0">
-                          <a:latin typeface="Arial"/>
+                          <a:latin typeface="Calibri" panose="020F0502020204030204" pitchFamily="34" charset="0"/>
+                          <a:cs typeface="Calibri" panose="020F0502020204030204" pitchFamily="34" charset="0"/>
                         </a:rPr>
                         <a:t>8300</a:t>
                       </a:r>
@@ -4454,7 +4514,8 @@
                       <a:pPr algn="l" defTabSz="914400"/>
                       <a:r>
                         <a:rPr sz="1400" dirty="0">
-                          <a:latin typeface="Arial"/>
+                          <a:latin typeface="Calibri" panose="020F0502020204030204" pitchFamily="34" charset="0"/>
+                          <a:cs typeface="Calibri" panose="020F0502020204030204" pitchFamily="34" charset="0"/>
                         </a:rPr>
                         <a:t>19000</a:t>
                       </a:r>
@@ -4470,7 +4531,8 @@
                       <a:pPr algn="l" defTabSz="914400"/>
                       <a:r>
                         <a:rPr sz="1400" dirty="0">
-                          <a:latin typeface="Arial"/>
+                          <a:latin typeface="Calibri" panose="020F0502020204030204" pitchFamily="34" charset="0"/>
+                          <a:cs typeface="Calibri" panose="020F0502020204030204" pitchFamily="34" charset="0"/>
                         </a:rPr>
                         <a:t>21000</a:t>
                       </a:r>
@@ -4486,7 +4548,8 @@
                       <a:pPr algn="l" defTabSz="914400"/>
                       <a:r>
                         <a:rPr sz="1400" dirty="0">
-                          <a:latin typeface="Arial"/>
+                          <a:latin typeface="Calibri" panose="020F0502020204030204" pitchFamily="34" charset="0"/>
+                          <a:cs typeface="Calibri" panose="020F0502020204030204" pitchFamily="34" charset="0"/>
                         </a:rPr>
                         <a:t>15230</a:t>
                       </a:r>
@@ -4502,7 +4565,8 @@
                       <a:pPr algn="l" defTabSz="914400"/>
                       <a:r>
                         <a:rPr sz="1400" dirty="0">
-                          <a:latin typeface="Arial"/>
+                          <a:latin typeface="Calibri" panose="020F0502020204030204" pitchFamily="34" charset="0"/>
+                          <a:cs typeface="Calibri" panose="020F0502020204030204" pitchFamily="34" charset="0"/>
                         </a:rPr>
                         <a:t>7230</a:t>
                       </a:r>
@@ -4518,7 +4582,8 @@
                       <a:pPr algn="l" defTabSz="914400"/>
                       <a:r>
                         <a:rPr sz="1400" dirty="0">
-                          <a:latin typeface="Arial"/>
+                          <a:latin typeface="Calibri" panose="020F0502020204030204" pitchFamily="34" charset="0"/>
+                          <a:cs typeface="Calibri" panose="020F0502020204030204" pitchFamily="34" charset="0"/>
                         </a:rPr>
                         <a:t>1800</a:t>
                       </a:r>
@@ -4534,7 +4599,8 @@
                       <a:pPr algn="l" defTabSz="914400"/>
                       <a:r>
                         <a:rPr sz="1400" dirty="0">
-                          <a:latin typeface="Arial"/>
+                          <a:latin typeface="Calibri" panose="020F0502020204030204" pitchFamily="34" charset="0"/>
+                          <a:cs typeface="Calibri" panose="020F0502020204030204" pitchFamily="34" charset="0"/>
                         </a:rPr>
                         <a:t>12093</a:t>
                       </a:r>
@@ -4550,7 +4616,8 @@
                       <a:pPr algn="l" defTabSz="914400"/>
                       <a:r>
                         <a:rPr sz="1400" dirty="0">
-                          <a:latin typeface="Arial"/>
+                          <a:latin typeface="Calibri" panose="020F0502020204030204" pitchFamily="34" charset="0"/>
+                          <a:cs typeface="Calibri" panose="020F0502020204030204" pitchFamily="34" charset="0"/>
                         </a:rPr>
                         <a:t>18000</a:t>
                       </a:r>
@@ -4573,7 +4640,8 @@
                       <a:pPr algn="l" defTabSz="914400"/>
                       <a:r>
                         <a:rPr sz="1400" dirty="0">
-                          <a:latin typeface="Arial"/>
+                          <a:latin typeface="Calibri" panose="020F0502020204030204" pitchFamily="34" charset="0"/>
+                          <a:cs typeface="Calibri" panose="020F0502020204030204" pitchFamily="34" charset="0"/>
                         </a:rPr>
                         <a:t>Mar</a:t>
                       </a:r>
@@ -4589,7 +4657,8 @@
                       <a:pPr algn="l" defTabSz="914400"/>
                       <a:r>
                         <a:rPr sz="1400" dirty="0">
-                          <a:latin typeface="Arial"/>
+                          <a:latin typeface="Calibri" panose="020F0502020204030204" pitchFamily="34" charset="0"/>
+                          <a:cs typeface="Calibri" panose="020F0502020204030204" pitchFamily="34" charset="0"/>
                         </a:rPr>
                         <a:t>4600</a:t>
                       </a:r>
@@ -4605,7 +4674,8 @@
                       <a:pPr algn="l" defTabSz="914400"/>
                       <a:r>
                         <a:rPr sz="1400" dirty="0">
-                          <a:latin typeface="Arial"/>
+                          <a:latin typeface="Calibri" panose="020F0502020204030204" pitchFamily="34" charset="0"/>
+                          <a:cs typeface="Calibri" panose="020F0502020204030204" pitchFamily="34" charset="0"/>
                         </a:rPr>
                         <a:t>9000</a:t>
                       </a:r>
@@ -4621,7 +4691,8 @@
                       <a:pPr algn="l" defTabSz="914400"/>
                       <a:r>
                         <a:rPr sz="1400" dirty="0">
-                          <a:latin typeface="Arial"/>
+                          <a:latin typeface="Calibri" panose="020F0502020204030204" pitchFamily="34" charset="0"/>
+                          <a:cs typeface="Calibri" panose="020F0502020204030204" pitchFamily="34" charset="0"/>
                         </a:rPr>
                         <a:t>7500</a:t>
                       </a:r>
@@ -4637,7 +4708,8 @@
                       <a:pPr algn="l" defTabSz="914400"/>
                       <a:r>
                         <a:rPr sz="1400" dirty="0">
-                          <a:latin typeface="Arial"/>
+                          <a:latin typeface="Calibri" panose="020F0502020204030204" pitchFamily="34" charset="0"/>
+                          <a:cs typeface="Calibri" panose="020F0502020204030204" pitchFamily="34" charset="0"/>
                         </a:rPr>
                         <a:t>8000</a:t>
                       </a:r>
@@ -4653,7 +4725,8 @@
                       <a:pPr algn="l" defTabSz="914400"/>
                       <a:r>
                         <a:rPr sz="1400" dirty="0">
-                          <a:latin typeface="Arial"/>
+                          <a:latin typeface="Calibri" panose="020F0502020204030204" pitchFamily="34" charset="0"/>
+                          <a:cs typeface="Calibri" panose="020F0502020204030204" pitchFamily="34" charset="0"/>
                         </a:rPr>
                         <a:t>30000</a:t>
                       </a:r>
@@ -4669,7 +4742,8 @@
                       <a:pPr algn="l" defTabSz="914400"/>
                       <a:r>
                         <a:rPr sz="1400" dirty="0">
-                          <a:latin typeface="Arial"/>
+                          <a:latin typeface="Calibri" panose="020F0502020204030204" pitchFamily="34" charset="0"/>
+                          <a:cs typeface="Calibri" panose="020F0502020204030204" pitchFamily="34" charset="0"/>
                         </a:rPr>
                         <a:t>22000</a:t>
                       </a:r>
@@ -4685,7 +4759,8 @@
                       <a:pPr algn="l" defTabSz="914400"/>
                       <a:r>
                         <a:rPr sz="1400" dirty="0">
-                          <a:latin typeface="Arial"/>
+                          <a:latin typeface="Calibri" panose="020F0502020204030204" pitchFamily="34" charset="0"/>
+                          <a:cs typeface="Calibri" panose="020F0502020204030204" pitchFamily="34" charset="0"/>
                         </a:rPr>
                         <a:t>13517</a:t>
                       </a:r>
@@ -4701,7 +4776,8 @@
                       <a:pPr algn="l" defTabSz="914400"/>
                       <a:r>
                         <a:rPr sz="1400" dirty="0">
-                          <a:latin typeface="Arial"/>
+                          <a:latin typeface="Calibri" panose="020F0502020204030204" pitchFamily="34" charset="0"/>
+                          <a:cs typeface="Calibri" panose="020F0502020204030204" pitchFamily="34" charset="0"/>
                         </a:rPr>
                         <a:t>13200</a:t>
                       </a:r>
@@ -4724,7 +4800,8 @@
                       <a:pPr algn="l" defTabSz="914400"/>
                       <a:r>
                         <a:rPr sz="1400" dirty="0">
-                          <a:latin typeface="Arial"/>
+                          <a:latin typeface="Calibri" panose="020F0502020204030204" pitchFamily="34" charset="0"/>
+                          <a:cs typeface="Calibri" panose="020F0502020204030204" pitchFamily="34" charset="0"/>
                         </a:rPr>
                         <a:t>Apr</a:t>
                       </a:r>
@@ -4740,7 +4817,8 @@
                       <a:pPr algn="l" defTabSz="914400"/>
                       <a:r>
                         <a:rPr sz="1400" dirty="0">
-                          <a:latin typeface="Arial"/>
+                          <a:latin typeface="Calibri" panose="020F0502020204030204" pitchFamily="34" charset="0"/>
+                          <a:cs typeface="Calibri" panose="020F0502020204030204" pitchFamily="34" charset="0"/>
                         </a:rPr>
                         <a:t>3530</a:t>
                       </a:r>
@@ -4756,7 +4834,8 @@
                       <a:pPr algn="l" defTabSz="914400"/>
                       <a:r>
                         <a:rPr sz="1400" dirty="0">
-                          <a:latin typeface="Arial"/>
+                          <a:latin typeface="Calibri" panose="020F0502020204030204" pitchFamily="34" charset="0"/>
+                          <a:cs typeface="Calibri" panose="020F0502020204030204" pitchFamily="34" charset="0"/>
                         </a:rPr>
                         <a:t>13430</a:t>
                       </a:r>
@@ -4772,7 +4851,8 @@
                       <a:pPr algn="l" defTabSz="914400"/>
                       <a:r>
                         <a:rPr sz="1400" dirty="0">
-                          <a:latin typeface="Arial"/>
+                          <a:latin typeface="Calibri" panose="020F0502020204030204" pitchFamily="34" charset="0"/>
+                          <a:cs typeface="Calibri" panose="020F0502020204030204" pitchFamily="34" charset="0"/>
                         </a:rPr>
                         <a:t>3550</a:t>
                       </a:r>
@@ -4788,7 +4868,8 @@
                       <a:pPr algn="l" defTabSz="914400"/>
                       <a:r>
                         <a:rPr sz="1400" dirty="0">
-                          <a:latin typeface="Arial"/>
+                          <a:latin typeface="Calibri" panose="020F0502020204030204" pitchFamily="34" charset="0"/>
+                          <a:cs typeface="Calibri" panose="020F0502020204030204" pitchFamily="34" charset="0"/>
                         </a:rPr>
                         <a:t>10670</a:t>
                       </a:r>
@@ -4804,7 +4885,8 @@
                       <a:pPr algn="l" defTabSz="914400"/>
                       <a:r>
                         <a:rPr sz="1400" dirty="0">
-                          <a:latin typeface="Arial"/>
+                          <a:latin typeface="Calibri" panose="020F0502020204030204" pitchFamily="34" charset="0"/>
+                          <a:cs typeface="Calibri" panose="020F0502020204030204" pitchFamily="34" charset="0"/>
                         </a:rPr>
                         <a:t>27860</a:t>
                       </a:r>
@@ -4820,7 +4902,8 @@
                       <a:pPr algn="l" defTabSz="914400"/>
                       <a:r>
                         <a:rPr sz="1400" dirty="0">
-                          <a:latin typeface="Arial"/>
+                          <a:latin typeface="Calibri" panose="020F0502020204030204" pitchFamily="34" charset="0"/>
+                          <a:cs typeface="Calibri" panose="020F0502020204030204" pitchFamily="34" charset="0"/>
                         </a:rPr>
                         <a:t>5414</a:t>
                       </a:r>
@@ -4836,7 +4919,8 @@
                       <a:pPr algn="l" defTabSz="914400"/>
                       <a:r>
                         <a:rPr sz="1400" dirty="0">
-                          <a:latin typeface="Arial"/>
+                          <a:latin typeface="Calibri" panose="020F0502020204030204" pitchFamily="34" charset="0"/>
+                          <a:cs typeface="Calibri" panose="020F0502020204030204" pitchFamily="34" charset="0"/>
                         </a:rPr>
                         <a:t>10742</a:t>
                       </a:r>
@@ -4852,7 +4936,8 @@
                       <a:pPr algn="l" defTabSz="914400"/>
                       <a:r>
                         <a:rPr sz="1400" dirty="0">
-                          <a:latin typeface="Arial"/>
+                          <a:latin typeface="Calibri" panose="020F0502020204030204" pitchFamily="34" charset="0"/>
+                          <a:cs typeface="Calibri" panose="020F0502020204030204" pitchFamily="34" charset="0"/>
                         </a:rPr>
                         <a:t>50000</a:t>
                       </a:r>
@@ -4875,7 +4960,8 @@
                       <a:pPr algn="l" defTabSz="914400"/>
                       <a:r>
                         <a:rPr sz="1400" dirty="0">
-                          <a:latin typeface="Arial"/>
+                          <a:latin typeface="Calibri" panose="020F0502020204030204" pitchFamily="34" charset="0"/>
+                          <a:cs typeface="Calibri" panose="020F0502020204030204" pitchFamily="34" charset="0"/>
                         </a:rPr>
                         <a:t>May</a:t>
                       </a:r>
@@ -4891,7 +4977,8 @@
                       <a:pPr algn="l" defTabSz="914400"/>
                       <a:r>
                         <a:rPr sz="1400" dirty="0">
-                          <a:latin typeface="Arial"/>
+                          <a:latin typeface="Calibri" panose="020F0502020204030204" pitchFamily="34" charset="0"/>
+                          <a:cs typeface="Calibri" panose="020F0502020204030204" pitchFamily="34" charset="0"/>
                         </a:rPr>
                         <a:t>10293</a:t>
                       </a:r>
@@ -4907,7 +4994,8 @@
                       <a:pPr algn="l" defTabSz="914400"/>
                       <a:r>
                         <a:rPr sz="1400" dirty="0">
-                          <a:latin typeface="Arial"/>
+                          <a:latin typeface="Calibri" panose="020F0502020204030204" pitchFamily="34" charset="0"/>
+                          <a:cs typeface="Calibri" panose="020F0502020204030204" pitchFamily="34" charset="0"/>
                         </a:rPr>
                         <a:t>23760</a:t>
                       </a:r>
@@ -4923,7 +5011,8 @@
                       <a:pPr algn="l" defTabSz="914400"/>
                       <a:r>
                         <a:rPr sz="1400" dirty="0">
-                          <a:latin typeface="Arial"/>
+                          <a:latin typeface="Calibri" panose="020F0502020204030204" pitchFamily="34" charset="0"/>
+                          <a:cs typeface="Calibri" panose="020F0502020204030204" pitchFamily="34" charset="0"/>
                         </a:rPr>
                         <a:t>10378</a:t>
                       </a:r>
@@ -4939,7 +5028,8 @@
                       <a:pPr algn="l" defTabSz="914400"/>
                       <a:r>
                         <a:rPr sz="1400" dirty="0">
-                          <a:latin typeface="Arial"/>
+                          <a:latin typeface="Calibri" panose="020F0502020204030204" pitchFamily="34" charset="0"/>
+                          <a:cs typeface="Calibri" panose="020F0502020204030204" pitchFamily="34" charset="0"/>
                         </a:rPr>
                         <a:t>24857</a:t>
                       </a:r>
@@ -4955,7 +5045,8 @@
                       <a:pPr algn="l" defTabSz="914400"/>
                       <a:r>
                         <a:rPr sz="1400" dirty="0">
-                          <a:latin typeface="Arial"/>
+                          <a:latin typeface="Calibri" panose="020F0502020204030204" pitchFamily="34" charset="0"/>
+                          <a:cs typeface="Calibri" panose="020F0502020204030204" pitchFamily="34" charset="0"/>
                         </a:rPr>
                         <a:t>12104</a:t>
                       </a:r>
@@ -4971,7 +5062,8 @@
                       <a:pPr algn="l" defTabSz="914400"/>
                       <a:r>
                         <a:rPr sz="1400" dirty="0">
-                          <a:latin typeface="Arial"/>
+                          <a:latin typeface="Calibri" panose="020F0502020204030204" pitchFamily="34" charset="0"/>
+                          <a:cs typeface="Calibri" panose="020F0502020204030204" pitchFamily="34" charset="0"/>
                         </a:rPr>
                         <a:t>21350</a:t>
                       </a:r>
@@ -4987,7 +5079,8 @@
                       <a:pPr algn="l" defTabSz="914400"/>
                       <a:r>
                         <a:rPr sz="1400" dirty="0">
-                          <a:latin typeface="Arial"/>
+                          <a:latin typeface="Calibri" panose="020F0502020204030204" pitchFamily="34" charset="0"/>
+                          <a:cs typeface="Calibri" panose="020F0502020204030204" pitchFamily="34" charset="0"/>
                         </a:rPr>
                         <a:t>17124</a:t>
                       </a:r>
@@ -5003,7 +5096,8 @@
                       <a:pPr algn="l" defTabSz="914400"/>
                       <a:r>
                         <a:rPr sz="1400" dirty="0">
-                          <a:latin typeface="Arial"/>
+                          <a:latin typeface="Calibri" panose="020F0502020204030204" pitchFamily="34" charset="0"/>
+                          <a:cs typeface="Calibri" panose="020F0502020204030204" pitchFamily="34" charset="0"/>
                         </a:rPr>
                         <a:t>25460</a:t>
                       </a:r>
@@ -5026,7 +5120,8 @@
                       <a:pPr algn="l" defTabSz="914400"/>
                       <a:r>
                         <a:rPr sz="1400" dirty="0">
-                          <a:latin typeface="Arial"/>
+                          <a:latin typeface="Calibri" panose="020F0502020204030204" pitchFamily="34" charset="0"/>
+                          <a:cs typeface="Calibri" panose="020F0502020204030204" pitchFamily="34" charset="0"/>
                         </a:rPr>
                         <a:t>Jun</a:t>
                       </a:r>
@@ -5042,7 +5137,8 @@
                       <a:pPr algn="l" defTabSz="914400"/>
                       <a:r>
                         <a:rPr sz="1400" dirty="0">
-                          <a:latin typeface="Arial"/>
+                          <a:latin typeface="Calibri" panose="020F0502020204030204" pitchFamily="34" charset="0"/>
+                          <a:cs typeface="Calibri" panose="020F0502020204030204" pitchFamily="34" charset="0"/>
                         </a:rPr>
                         <a:t>9070</a:t>
                       </a:r>
@@ -5058,7 +5154,8 @@
                       <a:pPr algn="l" defTabSz="914400"/>
                       <a:r>
                         <a:rPr sz="1400" dirty="0">
-                          <a:latin typeface="Arial"/>
+                          <a:latin typeface="Calibri" panose="020F0502020204030204" pitchFamily="34" charset="0"/>
+                          <a:cs typeface="Calibri" panose="020F0502020204030204" pitchFamily="34" charset="0"/>
                         </a:rPr>
                         <a:t>8218</a:t>
                       </a:r>
@@ -5074,7 +5171,8 @@
                       <a:pPr algn="l" defTabSz="914400"/>
                       <a:r>
                         <a:rPr sz="1400" dirty="0">
-                          <a:latin typeface="Arial"/>
+                          <a:latin typeface="Calibri" panose="020F0502020204030204" pitchFamily="34" charset="0"/>
+                          <a:cs typeface="Calibri" panose="020F0502020204030204" pitchFamily="34" charset="0"/>
                         </a:rPr>
                         <a:t>23480</a:t>
                       </a:r>
@@ -5090,7 +5188,8 @@
                       <a:pPr algn="l" defTabSz="914400"/>
                       <a:r>
                         <a:rPr sz="1400" dirty="0">
-                          <a:latin typeface="Arial"/>
+                          <a:latin typeface="Calibri" panose="020F0502020204030204" pitchFamily="34" charset="0"/>
+                          <a:cs typeface="Calibri" panose="020F0502020204030204" pitchFamily="34" charset="0"/>
                         </a:rPr>
                         <a:t>20492</a:t>
                       </a:r>
@@ -5106,7 +5205,8 @@
                       <a:pPr algn="l" defTabSz="914400"/>
                       <a:r>
                         <a:rPr sz="1400" dirty="0">
-                          <a:latin typeface="Arial"/>
+                          <a:latin typeface="Calibri" panose="020F0502020204030204" pitchFamily="34" charset="0"/>
+                          <a:cs typeface="Calibri" panose="020F0502020204030204" pitchFamily="34" charset="0"/>
                         </a:rPr>
                         <a:t>9103</a:t>
                       </a:r>
@@ -5122,7 +5222,8 @@
                       <a:pPr algn="l" defTabSz="914400"/>
                       <a:r>
                         <a:rPr sz="1400" dirty="0">
-                          <a:latin typeface="Arial"/>
+                          <a:latin typeface="Calibri" panose="020F0502020204030204" pitchFamily="34" charset="0"/>
+                          <a:cs typeface="Calibri" panose="020F0502020204030204" pitchFamily="34" charset="0"/>
                         </a:rPr>
                         <a:t>12300</a:t>
                       </a:r>
@@ -5138,7 +5239,8 @@
                       <a:pPr algn="l" defTabSz="914400"/>
                       <a:r>
                         <a:rPr sz="1400" dirty="0">
-                          <a:latin typeface="Arial"/>
+                          <a:latin typeface="Calibri" panose="020F0502020204030204" pitchFamily="34" charset="0"/>
+                          <a:cs typeface="Calibri" panose="020F0502020204030204" pitchFamily="34" charset="0"/>
                         </a:rPr>
                         <a:t>13777</a:t>
                       </a:r>
@@ -5154,7 +5256,8 @@
                       <a:pPr algn="l" defTabSz="914400"/>
                       <a:r>
                         <a:rPr sz="1400" dirty="0">
-                          <a:latin typeface="Arial"/>
+                          <a:latin typeface="Calibri" panose="020F0502020204030204" pitchFamily="34" charset="0"/>
+                          <a:cs typeface="Calibri" panose="020F0502020204030204" pitchFamily="34" charset="0"/>
                         </a:rPr>
                         <a:t>21600</a:t>
                       </a:r>
@@ -5177,7 +5280,8 @@
                       <a:pPr algn="l" defTabSz="914400"/>
                       <a:r>
                         <a:rPr sz="1400" dirty="0">
-                          <a:latin typeface="Arial"/>
+                          <a:latin typeface="Calibri" panose="020F0502020204030204" pitchFamily="34" charset="0"/>
+                          <a:cs typeface="Calibri" panose="020F0502020204030204" pitchFamily="34" charset="0"/>
                         </a:rPr>
                         <a:t>Jul</a:t>
                       </a:r>
@@ -5193,7 +5297,8 @@
                       <a:pPr algn="l" defTabSz="914400"/>
                       <a:r>
                         <a:rPr sz="1400" dirty="0">
-                          <a:latin typeface="Arial"/>
+                          <a:latin typeface="Calibri" panose="020F0502020204030204" pitchFamily="34" charset="0"/>
+                          <a:cs typeface="Calibri" panose="020F0502020204030204" pitchFamily="34" charset="0"/>
                         </a:rPr>
                         <a:t>23500</a:t>
                       </a:r>
@@ -5209,7 +5314,8 @@
                       <a:pPr algn="l" defTabSz="914400"/>
                       <a:r>
                         <a:rPr sz="1400" dirty="0">
-                          <a:latin typeface="Arial"/>
+                          <a:latin typeface="Calibri" panose="020F0502020204030204" pitchFamily="34" charset="0"/>
+                          <a:cs typeface="Calibri" panose="020F0502020204030204" pitchFamily="34" charset="0"/>
                         </a:rPr>
                         <a:t>19230</a:t>
                       </a:r>
@@ -5225,7 +5331,8 @@
                       <a:pPr algn="l" defTabSz="914400"/>
                       <a:r>
                         <a:rPr sz="1400" dirty="0">
-                          <a:latin typeface="Arial"/>
+                          <a:latin typeface="Calibri" panose="020F0502020204030204" pitchFamily="34" charset="0"/>
+                          <a:cs typeface="Calibri" panose="020F0502020204030204" pitchFamily="34" charset="0"/>
                         </a:rPr>
                         <a:t>87390</a:t>
                       </a:r>
@@ -5241,7 +5348,8 @@
                       <a:pPr algn="l" defTabSz="914400"/>
                       <a:r>
                         <a:rPr sz="1400" dirty="0">
-                          <a:latin typeface="Arial"/>
+                          <a:latin typeface="Calibri" panose="020F0502020204030204" pitchFamily="34" charset="0"/>
+                          <a:cs typeface="Calibri" panose="020F0502020204030204" pitchFamily="34" charset="0"/>
                         </a:rPr>
                         <a:t>25030</a:t>
                       </a:r>
@@ -5257,7 +5365,8 @@
                       <a:pPr algn="l" defTabSz="914400"/>
                       <a:r>
                         <a:rPr sz="1400" dirty="0">
-                          <a:latin typeface="Arial"/>
+                          <a:latin typeface="Calibri" panose="020F0502020204030204" pitchFamily="34" charset="0"/>
+                          <a:cs typeface="Calibri" panose="020F0502020204030204" pitchFamily="34" charset="0"/>
                         </a:rPr>
                         <a:t>28000</a:t>
                       </a:r>
@@ -5273,7 +5382,8 @@
                       <a:pPr algn="l" defTabSz="914400"/>
                       <a:r>
                         <a:rPr sz="1400" dirty="0">
-                          <a:latin typeface="Arial"/>
+                          <a:latin typeface="Calibri" panose="020F0502020204030204" pitchFamily="34" charset="0"/>
+                          <a:cs typeface="Calibri" panose="020F0502020204030204" pitchFamily="34" charset="0"/>
                         </a:rPr>
                         <a:t>11890</a:t>
                       </a:r>
@@ -5289,7 +5399,8 @@
                       <a:pPr algn="l" defTabSz="914400"/>
                       <a:r>
                         <a:rPr sz="1400" dirty="0">
-                          <a:latin typeface="Arial"/>
+                          <a:latin typeface="Calibri" panose="020F0502020204030204" pitchFamily="34" charset="0"/>
+                          <a:cs typeface="Calibri" panose="020F0502020204030204" pitchFamily="34" charset="0"/>
                         </a:rPr>
                         <a:t>32507</a:t>
                       </a:r>
@@ -5305,7 +5416,8 @@
                       <a:pPr algn="l" defTabSz="914400"/>
                       <a:r>
                         <a:rPr sz="1400" dirty="0">
-                          <a:latin typeface="Arial"/>
+                          <a:latin typeface="Calibri" panose="020F0502020204030204" pitchFamily="34" charset="0"/>
+                          <a:cs typeface="Calibri" panose="020F0502020204030204" pitchFamily="34" charset="0"/>
                         </a:rPr>
                         <a:t>37800</a:t>
                       </a:r>
@@ -5328,7 +5440,8 @@
                       <a:pPr algn="l" defTabSz="914400"/>
                       <a:r>
                         <a:rPr sz="1400" dirty="0">
-                          <a:latin typeface="Arial"/>
+                          <a:latin typeface="Calibri" panose="020F0502020204030204" pitchFamily="34" charset="0"/>
+                          <a:cs typeface="Calibri" panose="020F0502020204030204" pitchFamily="34" charset="0"/>
                         </a:rPr>
                         <a:t>Aug</a:t>
                       </a:r>
@@ -5344,7 +5457,8 @@
                       <a:pPr algn="l" defTabSz="914400"/>
                       <a:r>
                         <a:rPr sz="1400" dirty="0">
-                          <a:latin typeface="Arial"/>
+                          <a:latin typeface="Calibri" panose="020F0502020204030204" pitchFamily="34" charset="0"/>
+                          <a:cs typeface="Calibri" panose="020F0502020204030204" pitchFamily="34" charset="0"/>
                         </a:rPr>
                         <a:t>39000</a:t>
                       </a:r>
@@ -5360,7 +5474,8 @@
                       <a:pPr algn="l" defTabSz="914400"/>
                       <a:r>
                         <a:rPr sz="1400" dirty="0">
-                          <a:latin typeface="Arial"/>
+                          <a:latin typeface="Calibri" panose="020F0502020204030204" pitchFamily="34" charset="0"/>
+                          <a:cs typeface="Calibri" panose="020F0502020204030204" pitchFamily="34" charset="0"/>
                         </a:rPr>
                         <a:t>30301</a:t>
                       </a:r>
@@ -5376,7 +5491,8 @@
                       <a:pPr algn="l" defTabSz="914400"/>
                       <a:r>
                         <a:rPr sz="1400" dirty="0">
-                          <a:latin typeface="Arial"/>
+                          <a:latin typeface="Calibri" panose="020F0502020204030204" pitchFamily="34" charset="0"/>
+                          <a:cs typeface="Calibri" panose="020F0502020204030204" pitchFamily="34" charset="0"/>
                         </a:rPr>
                         <a:t>78356</a:t>
                       </a:r>
@@ -5392,7 +5508,8 @@
                       <a:pPr algn="l" defTabSz="914400"/>
                       <a:r>
                         <a:rPr sz="1400" dirty="0">
-                          <a:latin typeface="Arial"/>
+                          <a:latin typeface="Calibri" panose="020F0502020204030204" pitchFamily="34" charset="0"/>
+                          <a:cs typeface="Calibri" panose="020F0502020204030204" pitchFamily="34" charset="0"/>
                         </a:rPr>
                         <a:t>21121</a:t>
                       </a:r>
@@ -5408,7 +5525,8 @@
                       <a:pPr algn="l" defTabSz="914400"/>
                       <a:r>
                         <a:rPr sz="1400" dirty="0">
-                          <a:latin typeface="Arial"/>
+                          <a:latin typeface="Calibri" panose="020F0502020204030204" pitchFamily="34" charset="0"/>
+                          <a:cs typeface="Calibri" panose="020F0502020204030204" pitchFamily="34" charset="0"/>
                         </a:rPr>
                         <a:t>30443</a:t>
                       </a:r>
@@ -5424,7 +5542,8 @@
                       <a:pPr algn="l" defTabSz="914400"/>
                       <a:r>
                         <a:rPr sz="1400" dirty="0">
-                          <a:latin typeface="Arial"/>
+                          <a:latin typeface="Calibri" panose="020F0502020204030204" pitchFamily="34" charset="0"/>
+                          <a:cs typeface="Calibri" panose="020F0502020204030204" pitchFamily="34" charset="0"/>
                         </a:rPr>
                         <a:t>23230</a:t>
                       </a:r>
@@ -5440,7 +5559,8 @@
                       <a:pPr algn="l" defTabSz="914400"/>
                       <a:r>
                         <a:rPr sz="1400" dirty="0">
-                          <a:latin typeface="Arial"/>
+                          <a:latin typeface="Calibri" panose="020F0502020204030204" pitchFamily="34" charset="0"/>
+                          <a:cs typeface="Calibri" panose="020F0502020204030204" pitchFamily="34" charset="0"/>
                         </a:rPr>
                         <a:t>37075</a:t>
                       </a:r>
@@ -5456,7 +5576,8 @@
                       <a:pPr algn="l" defTabSz="914400"/>
                       <a:r>
                         <a:rPr sz="1400" dirty="0">
-                          <a:latin typeface="Arial"/>
+                          <a:latin typeface="Calibri" panose="020F0502020204030204" pitchFamily="34" charset="0"/>
+                          <a:cs typeface="Calibri" panose="020F0502020204030204" pitchFamily="34" charset="0"/>
                         </a:rPr>
                         <a:t>40900</a:t>
                       </a:r>
@@ -5479,7 +5600,8 @@
                       <a:pPr algn="l" defTabSz="914400"/>
                       <a:r>
                         <a:rPr sz="1400" dirty="0">
-                          <a:latin typeface="Arial"/>
+                          <a:latin typeface="Calibri" panose="020F0502020204030204" pitchFamily="34" charset="0"/>
+                          <a:cs typeface="Calibri" panose="020F0502020204030204" pitchFamily="34" charset="0"/>
                         </a:rPr>
                         <a:t>Sep</a:t>
                       </a:r>
@@ -5495,7 +5617,8 @@
                       <a:pPr algn="l" defTabSz="914400"/>
                       <a:r>
                         <a:rPr sz="1400" dirty="0">
-                          <a:latin typeface="Arial"/>
+                          <a:latin typeface="Calibri" panose="020F0502020204030204" pitchFamily="34" charset="0"/>
+                          <a:cs typeface="Calibri" panose="020F0502020204030204" pitchFamily="34" charset="0"/>
                         </a:rPr>
                         <a:t>14340</a:t>
                       </a:r>
@@ -5511,7 +5634,8 @@
                       <a:pPr algn="l" defTabSz="914400"/>
                       <a:r>
                         <a:rPr sz="1400" dirty="0">
-                          <a:latin typeface="Arial"/>
+                          <a:latin typeface="Calibri" panose="020F0502020204030204" pitchFamily="34" charset="0"/>
+                          <a:cs typeface="Calibri" panose="020F0502020204030204" pitchFamily="34" charset="0"/>
                         </a:rPr>
                         <a:t>19403</a:t>
                       </a:r>
@@ -5527,7 +5651,8 @@
                       <a:pPr algn="l" defTabSz="914400"/>
                       <a:r>
                         <a:rPr sz="1400" dirty="0">
-                          <a:latin typeface="Arial"/>
+                          <a:latin typeface="Calibri" panose="020F0502020204030204" pitchFamily="34" charset="0"/>
+                          <a:cs typeface="Calibri" panose="020F0502020204030204" pitchFamily="34" charset="0"/>
                         </a:rPr>
                         <a:t>89024</a:t>
                       </a:r>
@@ -5543,7 +5668,8 @@
                       <a:pPr algn="l" defTabSz="914400"/>
                       <a:r>
                         <a:rPr sz="1400" dirty="0">
-                          <a:latin typeface="Arial"/>
+                          <a:latin typeface="Calibri" panose="020F0502020204030204" pitchFamily="34" charset="0"/>
+                          <a:cs typeface="Calibri" panose="020F0502020204030204" pitchFamily="34" charset="0"/>
                         </a:rPr>
                         <a:t>1230</a:t>
                       </a:r>
@@ -5559,7 +5685,8 @@
                       <a:pPr algn="l" defTabSz="914400"/>
                       <a:r>
                         <a:rPr sz="1400" dirty="0">
-                          <a:latin typeface="Arial"/>
+                          <a:latin typeface="Calibri" panose="020F0502020204030204" pitchFamily="34" charset="0"/>
+                          <a:cs typeface="Calibri" panose="020F0502020204030204" pitchFamily="34" charset="0"/>
                         </a:rPr>
                         <a:t>12561</a:t>
                       </a:r>
@@ -5575,7 +5702,8 @@
                       <a:pPr algn="l" defTabSz="914400"/>
                       <a:r>
                         <a:rPr sz="1400" dirty="0">
-                          <a:latin typeface="Arial"/>
+                          <a:latin typeface="Calibri" panose="020F0502020204030204" pitchFamily="34" charset="0"/>
+                          <a:cs typeface="Calibri" panose="020F0502020204030204" pitchFamily="34" charset="0"/>
                         </a:rPr>
                         <a:t>29000</a:t>
                       </a:r>
@@ -5591,7 +5719,8 @@
                       <a:pPr algn="l" defTabSz="914400"/>
                       <a:r>
                         <a:rPr sz="1400" dirty="0">
-                          <a:latin typeface="Arial"/>
+                          <a:latin typeface="Calibri" panose="020F0502020204030204" pitchFamily="34" charset="0"/>
+                          <a:cs typeface="Calibri" panose="020F0502020204030204" pitchFamily="34" charset="0"/>
                         </a:rPr>
                         <a:t>27593</a:t>
                       </a:r>
@@ -5607,7 +5736,8 @@
                       <a:pPr algn="l" defTabSz="914400"/>
                       <a:r>
                         <a:rPr sz="1400" dirty="0">
-                          <a:latin typeface="Arial"/>
+                          <a:latin typeface="Calibri" panose="020F0502020204030204" pitchFamily="34" charset="0"/>
+                          <a:cs typeface="Calibri" panose="020F0502020204030204" pitchFamily="34" charset="0"/>
                         </a:rPr>
                         <a:t>29800</a:t>
                       </a:r>

</xml_diff>